<commit_message>
Added Video for Channel Snapshots.
</commit_message>
<xml_diff>
--- a/Channels/Channels_Diagrams.pptx
+++ b/Channels/Channels_Diagrams.pptx
@@ -16,6 +16,8 @@
     <p:sldId id="257" r:id="rId10"/>
     <p:sldId id="266" r:id="rId11"/>
     <p:sldId id="267" r:id="rId12"/>
+    <p:sldId id="268" r:id="rId13"/>
+    <p:sldId id="269" r:id="rId14"/>
   </p:sldIdLst>
   <p:sldSz cx="9144000" cy="6858000" type="screen4x3"/>
   <p:notesSz cx="6858000" cy="9144000"/>
@@ -7976,6 +7978,1773 @@
 </p:sld>
 </file>
 
+<file path=ppt/slides/slide12.xml><?xml version="1.0" encoding="utf-8"?>
+<p:sld xmlns:a="http://schemas.openxmlformats.org/drawingml/2006/main" xmlns:r="http://schemas.openxmlformats.org/officeDocument/2006/relationships" xmlns:p="http://schemas.openxmlformats.org/presentationml/2006/main">
+  <p:cSld>
+    <p:spTree>
+      <p:nvGrpSpPr>
+        <p:cNvPr id="1" name=""/>
+        <p:cNvGrpSpPr/>
+        <p:nvPr/>
+      </p:nvGrpSpPr>
+      <p:grpSpPr>
+        <a:xfrm>
+          <a:off x="0" y="0"/>
+          <a:ext cx="0" cy="0"/>
+          <a:chOff x="0" y="0"/>
+          <a:chExt cx="0" cy="0"/>
+        </a:xfrm>
+      </p:grpSpPr>
+      <p:cxnSp>
+        <p:nvCxnSpPr>
+          <p:cNvPr id="4" name="Straight Arrow Connector 3"/>
+          <p:cNvCxnSpPr/>
+          <p:nvPr/>
+        </p:nvCxnSpPr>
+        <p:spPr>
+          <a:xfrm flipV="1">
+            <a:off x="482910" y="1844407"/>
+            <a:ext cx="7655026" cy="24774"/>
+          </a:xfrm>
+          <a:prstGeom prst="straightConnector1">
+            <a:avLst/>
+          </a:prstGeom>
+          <a:ln w="76200" cmpd="sng">
+            <a:tailEnd type="arrow"/>
+          </a:ln>
+        </p:spPr>
+        <p:style>
+          <a:lnRef idx="2">
+            <a:schemeClr val="accent1"/>
+          </a:lnRef>
+          <a:fillRef idx="0">
+            <a:schemeClr val="accent1"/>
+          </a:fillRef>
+          <a:effectRef idx="1">
+            <a:schemeClr val="accent1"/>
+          </a:effectRef>
+          <a:fontRef idx="minor">
+            <a:schemeClr val="tx1"/>
+          </a:fontRef>
+        </p:style>
+      </p:cxnSp>
+      <p:cxnSp>
+        <p:nvCxnSpPr>
+          <p:cNvPr id="6" name="Straight Arrow Connector 5"/>
+          <p:cNvCxnSpPr/>
+          <p:nvPr/>
+        </p:nvCxnSpPr>
+        <p:spPr>
+          <a:xfrm flipV="1">
+            <a:off x="482910" y="4173613"/>
+            <a:ext cx="7655026" cy="24774"/>
+          </a:xfrm>
+          <a:prstGeom prst="straightConnector1">
+            <a:avLst/>
+          </a:prstGeom>
+          <a:ln w="76200" cmpd="sng">
+            <a:tailEnd type="arrow"/>
+          </a:ln>
+        </p:spPr>
+        <p:style>
+          <a:lnRef idx="2">
+            <a:schemeClr val="accent1"/>
+          </a:lnRef>
+          <a:fillRef idx="0">
+            <a:schemeClr val="accent1"/>
+          </a:fillRef>
+          <a:effectRef idx="1">
+            <a:schemeClr val="accent1"/>
+          </a:effectRef>
+          <a:fontRef idx="minor">
+            <a:schemeClr val="tx1"/>
+          </a:fontRef>
+        </p:style>
+      </p:cxnSp>
+      <p:cxnSp>
+        <p:nvCxnSpPr>
+          <p:cNvPr id="7" name="Straight Arrow Connector 6"/>
+          <p:cNvCxnSpPr>
+            <a:stCxn id="32" idx="5"/>
+            <a:endCxn id="5" idx="1"/>
+          </p:cNvCxnSpPr>
+          <p:nvPr/>
+        </p:nvCxnSpPr>
+        <p:spPr>
+          <a:xfrm>
+            <a:off x="1716449" y="2095483"/>
+            <a:ext cx="2406415" cy="1838989"/>
+          </a:xfrm>
+          <a:prstGeom prst="straightConnector1">
+            <a:avLst/>
+          </a:prstGeom>
+          <a:ln w="76200" cmpd="sng">
+            <a:solidFill>
+              <a:srgbClr val="FF0000"/>
+            </a:solidFill>
+            <a:tailEnd type="arrow"/>
+          </a:ln>
+        </p:spPr>
+        <p:style>
+          <a:lnRef idx="2">
+            <a:schemeClr val="accent1"/>
+          </a:lnRef>
+          <a:fillRef idx="0">
+            <a:schemeClr val="accent1"/>
+          </a:fillRef>
+          <a:effectRef idx="1">
+            <a:schemeClr val="accent1"/>
+          </a:effectRef>
+          <a:fontRef idx="minor">
+            <a:schemeClr val="tx1"/>
+          </a:fontRef>
+        </p:style>
+      </p:cxnSp>
+      <p:sp>
+        <p:nvSpPr>
+          <p:cNvPr id="22" name="TextBox 21"/>
+          <p:cNvSpPr txBox="1"/>
+          <p:nvPr/>
+        </p:nvSpPr>
+        <p:spPr>
+          <a:xfrm>
+            <a:off x="7295275" y="1259631"/>
+            <a:ext cx="433332" cy="584776"/>
+          </a:xfrm>
+          <a:prstGeom prst="rect">
+            <a:avLst/>
+          </a:prstGeom>
+          <a:noFill/>
+        </p:spPr>
+        <p:txBody>
+          <a:bodyPr wrap="none" rtlCol="0">
+            <a:spAutoFit/>
+          </a:bodyPr>
+          <a:lstStyle/>
+          <a:p>
+            <a:r>
+              <a:rPr lang="en-US" sz="3200" b="1" dirty="0" smtClean="0"/>
+              <a:t>A</a:t>
+            </a:r>
+            <a:endParaRPr lang="en-US" sz="3200" b="1" dirty="0"/>
+          </a:p>
+        </p:txBody>
+      </p:sp>
+      <p:sp>
+        <p:nvSpPr>
+          <p:cNvPr id="23" name="TextBox 22"/>
+          <p:cNvSpPr txBox="1"/>
+          <p:nvPr/>
+        </p:nvSpPr>
+        <p:spPr>
+          <a:xfrm>
+            <a:off x="7368856" y="4173613"/>
+            <a:ext cx="414697" cy="584776"/>
+          </a:xfrm>
+          <a:prstGeom prst="rect">
+            <a:avLst/>
+          </a:prstGeom>
+          <a:noFill/>
+        </p:spPr>
+        <p:txBody>
+          <a:bodyPr wrap="none" rtlCol="0">
+            <a:spAutoFit/>
+          </a:bodyPr>
+          <a:lstStyle/>
+          <a:p>
+            <a:r>
+              <a:rPr lang="en-US" sz="3200" b="1" dirty="0"/>
+              <a:t>B</a:t>
+            </a:r>
+          </a:p>
+        </p:txBody>
+      </p:sp>
+      <p:sp>
+        <p:nvSpPr>
+          <p:cNvPr id="34" name="TextBox 33"/>
+          <p:cNvSpPr txBox="1"/>
+          <p:nvPr/>
+        </p:nvSpPr>
+        <p:spPr>
+          <a:xfrm>
+            <a:off x="3101480" y="3338444"/>
+            <a:ext cx="657151" cy="584776"/>
+          </a:xfrm>
+          <a:prstGeom prst="rect">
+            <a:avLst/>
+          </a:prstGeom>
+          <a:noFill/>
+        </p:spPr>
+        <p:txBody>
+          <a:bodyPr wrap="none" rtlCol="0">
+            <a:spAutoFit/>
+          </a:bodyPr>
+          <a:lstStyle/>
+          <a:p>
+            <a:r>
+              <a:rPr lang="en-US" sz="3200" b="1" dirty="0" smtClean="0"/>
+              <a:t>m</a:t>
+            </a:r>
+            <a:r>
+              <a:rPr lang="en-US" sz="3200" b="1" baseline="-25000" dirty="0"/>
+              <a:t>1</a:t>
+            </a:r>
+          </a:p>
+        </p:txBody>
+      </p:sp>
+      <p:sp>
+        <p:nvSpPr>
+          <p:cNvPr id="37" name="TextBox 36"/>
+          <p:cNvSpPr txBox="1"/>
+          <p:nvPr/>
+        </p:nvSpPr>
+        <p:spPr>
+          <a:xfrm>
+            <a:off x="5598185" y="676481"/>
+            <a:ext cx="3214166" cy="523220"/>
+          </a:xfrm>
+          <a:prstGeom prst="rect">
+            <a:avLst/>
+          </a:prstGeom>
+          <a:noFill/>
+        </p:spPr>
+        <p:txBody>
+          <a:bodyPr wrap="none" rtlCol="0">
+            <a:spAutoFit/>
+          </a:bodyPr>
+          <a:lstStyle/>
+          <a:p>
+            <a:r>
+              <a:rPr lang="en-US" sz="2800" b="1" dirty="0" smtClean="0"/>
+              <a:t>Timeline for agent A</a:t>
+            </a:r>
+            <a:endParaRPr lang="en-US" sz="2800" b="1" dirty="0"/>
+          </a:p>
+        </p:txBody>
+      </p:sp>
+      <p:cxnSp>
+        <p:nvCxnSpPr>
+          <p:cNvPr id="39" name="Straight Arrow Connector 38"/>
+          <p:cNvCxnSpPr>
+            <a:stCxn id="37" idx="2"/>
+          </p:cNvCxnSpPr>
+          <p:nvPr/>
+        </p:nvCxnSpPr>
+        <p:spPr>
+          <a:xfrm flipH="1">
+            <a:off x="6992156" y="1199701"/>
+            <a:ext cx="213112" cy="669480"/>
+          </a:xfrm>
+          <a:prstGeom prst="straightConnector1">
+            <a:avLst/>
+          </a:prstGeom>
+          <a:ln>
+            <a:prstDash val="dash"/>
+            <a:tailEnd type="arrow"/>
+          </a:ln>
+        </p:spPr>
+        <p:style>
+          <a:lnRef idx="2">
+            <a:schemeClr val="accent1"/>
+          </a:lnRef>
+          <a:fillRef idx="0">
+            <a:schemeClr val="accent1"/>
+          </a:fillRef>
+          <a:effectRef idx="1">
+            <a:schemeClr val="accent1"/>
+          </a:effectRef>
+          <a:fontRef idx="minor">
+            <a:schemeClr val="tx1"/>
+          </a:fontRef>
+        </p:style>
+      </p:cxnSp>
+      <p:sp>
+        <p:nvSpPr>
+          <p:cNvPr id="40" name="TextBox 39"/>
+          <p:cNvSpPr txBox="1"/>
+          <p:nvPr/>
+        </p:nvSpPr>
+        <p:spPr>
+          <a:xfrm>
+            <a:off x="5170034" y="4885275"/>
+            <a:ext cx="3197861" cy="523220"/>
+          </a:xfrm>
+          <a:prstGeom prst="rect">
+            <a:avLst/>
+          </a:prstGeom>
+          <a:noFill/>
+        </p:spPr>
+        <p:txBody>
+          <a:bodyPr wrap="none" rtlCol="0">
+            <a:spAutoFit/>
+          </a:bodyPr>
+          <a:lstStyle/>
+          <a:p>
+            <a:r>
+              <a:rPr lang="en-US" sz="2800" b="1" dirty="0" smtClean="0"/>
+              <a:t>Timeline for agent B</a:t>
+            </a:r>
+            <a:endParaRPr lang="en-US" sz="2800" b="1" dirty="0"/>
+          </a:p>
+        </p:txBody>
+      </p:sp>
+      <p:cxnSp>
+        <p:nvCxnSpPr>
+          <p:cNvPr id="42" name="Straight Arrow Connector 41"/>
+          <p:cNvCxnSpPr>
+            <a:stCxn id="40" idx="0"/>
+          </p:cNvCxnSpPr>
+          <p:nvPr/>
+        </p:nvCxnSpPr>
+        <p:spPr>
+          <a:xfrm flipV="1">
+            <a:off x="6768965" y="4198387"/>
+            <a:ext cx="223191" cy="686888"/>
+          </a:xfrm>
+          <a:prstGeom prst="straightConnector1">
+            <a:avLst/>
+          </a:prstGeom>
+          <a:ln>
+            <a:prstDash val="dash"/>
+            <a:tailEnd type="arrow"/>
+          </a:ln>
+        </p:spPr>
+        <p:style>
+          <a:lnRef idx="2">
+            <a:schemeClr val="accent1"/>
+          </a:lnRef>
+          <a:fillRef idx="0">
+            <a:schemeClr val="accent1"/>
+          </a:fillRef>
+          <a:effectRef idx="1">
+            <a:schemeClr val="accent1"/>
+          </a:effectRef>
+          <a:fontRef idx="minor">
+            <a:schemeClr val="tx1"/>
+          </a:fontRef>
+        </p:style>
+      </p:cxnSp>
+      <p:sp>
+        <p:nvSpPr>
+          <p:cNvPr id="43" name="TextBox 42"/>
+          <p:cNvSpPr txBox="1"/>
+          <p:nvPr/>
+        </p:nvSpPr>
+        <p:spPr>
+          <a:xfrm>
+            <a:off x="399535" y="5761806"/>
+            <a:ext cx="5738486" cy="523220"/>
+          </a:xfrm>
+          <a:prstGeom prst="rect">
+            <a:avLst/>
+          </a:prstGeom>
+          <a:noFill/>
+        </p:spPr>
+        <p:txBody>
+          <a:bodyPr wrap="none" rtlCol="0">
+            <a:spAutoFit/>
+          </a:bodyPr>
+          <a:lstStyle/>
+          <a:p>
+            <a:r>
+              <a:rPr lang="en-US" sz="2800" b="1" dirty="0" smtClean="0"/>
+              <a:t>Message </a:t>
+            </a:r>
+            <a:r>
+              <a:rPr lang="en-US" sz="2800" b="1" dirty="0" smtClean="0"/>
+              <a:t>m</a:t>
+            </a:r>
+            <a:r>
+              <a:rPr lang="en-US" sz="2800" b="1" baseline="-25000" dirty="0"/>
+              <a:t>1</a:t>
+            </a:r>
+            <a:r>
+              <a:rPr lang="en-US" sz="2800" b="1" baseline="-25000" dirty="0" smtClean="0"/>
+              <a:t> </a:t>
+            </a:r>
+            <a:r>
+              <a:rPr lang="en-US" sz="2800" b="1" dirty="0" smtClean="0"/>
+              <a:t>received </a:t>
+            </a:r>
+            <a:r>
+              <a:rPr lang="en-US" sz="2800" b="1" dirty="0" smtClean="0"/>
+              <a:t>by B in event W</a:t>
+            </a:r>
+            <a:endParaRPr lang="en-US" sz="2800" b="1" dirty="0"/>
+          </a:p>
+        </p:txBody>
+      </p:sp>
+      <p:sp>
+        <p:nvSpPr>
+          <p:cNvPr id="44" name="TextBox 43"/>
+          <p:cNvSpPr txBox="1"/>
+          <p:nvPr/>
+        </p:nvSpPr>
+        <p:spPr>
+          <a:xfrm>
+            <a:off x="178856" y="261610"/>
+            <a:ext cx="5034017" cy="523220"/>
+          </a:xfrm>
+          <a:prstGeom prst="rect">
+            <a:avLst/>
+          </a:prstGeom>
+          <a:noFill/>
+        </p:spPr>
+        <p:txBody>
+          <a:bodyPr wrap="none" rtlCol="0">
+            <a:spAutoFit/>
+          </a:bodyPr>
+          <a:lstStyle/>
+          <a:p>
+            <a:r>
+              <a:rPr lang="en-US" sz="2800" b="1" dirty="0" smtClean="0"/>
+              <a:t>Message </a:t>
+            </a:r>
+            <a:r>
+              <a:rPr lang="en-US" sz="2800" b="1" dirty="0" smtClean="0"/>
+              <a:t>m</a:t>
+            </a:r>
+            <a:r>
+              <a:rPr lang="en-US" sz="2800" b="1" baseline="-25000" dirty="0"/>
+              <a:t>1</a:t>
+            </a:r>
+            <a:r>
+              <a:rPr lang="en-US" sz="2800" b="1" baseline="-25000" dirty="0" smtClean="0"/>
+              <a:t> </a:t>
+            </a:r>
+            <a:r>
+              <a:rPr lang="en-US" sz="2800" b="1" dirty="0" smtClean="0"/>
+              <a:t>sent </a:t>
+            </a:r>
+            <a:r>
+              <a:rPr lang="en-US" sz="2800" b="1" dirty="0" smtClean="0"/>
+              <a:t>by A in event U</a:t>
+            </a:r>
+            <a:endParaRPr lang="en-US" sz="2800" b="1" dirty="0"/>
+          </a:p>
+        </p:txBody>
+      </p:sp>
+      <p:cxnSp>
+        <p:nvCxnSpPr>
+          <p:cNvPr id="48" name="Straight Arrow Connector 47"/>
+          <p:cNvCxnSpPr>
+            <a:stCxn id="44" idx="2"/>
+            <a:endCxn id="32" idx="0"/>
+          </p:cNvCxnSpPr>
+          <p:nvPr/>
+        </p:nvCxnSpPr>
+        <p:spPr>
+          <a:xfrm flipH="1">
+            <a:off x="1490147" y="784830"/>
+            <a:ext cx="1205718" cy="764311"/>
+          </a:xfrm>
+          <a:prstGeom prst="straightConnector1">
+            <a:avLst/>
+          </a:prstGeom>
+          <a:ln>
+            <a:prstDash val="dash"/>
+            <a:tailEnd type="arrow"/>
+          </a:ln>
+        </p:spPr>
+        <p:style>
+          <a:lnRef idx="2">
+            <a:schemeClr val="accent1"/>
+          </a:lnRef>
+          <a:fillRef idx="0">
+            <a:schemeClr val="accent1"/>
+          </a:fillRef>
+          <a:effectRef idx="1">
+            <a:schemeClr val="accent1"/>
+          </a:effectRef>
+          <a:fontRef idx="minor">
+            <a:schemeClr val="tx1"/>
+          </a:fontRef>
+        </p:style>
+      </p:cxnSp>
+      <p:cxnSp>
+        <p:nvCxnSpPr>
+          <p:cNvPr id="50" name="Straight Arrow Connector 49"/>
+          <p:cNvCxnSpPr>
+            <a:stCxn id="43" idx="0"/>
+            <a:endCxn id="5" idx="4"/>
+          </p:cNvCxnSpPr>
+          <p:nvPr/>
+        </p:nvCxnSpPr>
+        <p:spPr>
+          <a:xfrm flipV="1">
+            <a:off x="3268778" y="4480814"/>
+            <a:ext cx="1080388" cy="1280992"/>
+          </a:xfrm>
+          <a:prstGeom prst="straightConnector1">
+            <a:avLst/>
+          </a:prstGeom>
+          <a:ln>
+            <a:prstDash val="dash"/>
+            <a:tailEnd type="arrow"/>
+          </a:ln>
+        </p:spPr>
+        <p:style>
+          <a:lnRef idx="2">
+            <a:schemeClr val="accent1"/>
+          </a:lnRef>
+          <a:fillRef idx="0">
+            <a:schemeClr val="accent1"/>
+          </a:fillRef>
+          <a:effectRef idx="1">
+            <a:schemeClr val="accent1"/>
+          </a:effectRef>
+          <a:fontRef idx="minor">
+            <a:schemeClr val="tx1"/>
+          </a:fontRef>
+        </p:style>
+      </p:cxnSp>
+      <p:sp>
+        <p:nvSpPr>
+          <p:cNvPr id="5" name="Oval 4"/>
+          <p:cNvSpPr>
+            <a:spLocks noChangeAspect="1"/>
+          </p:cNvSpPr>
+          <p:nvPr/>
+        </p:nvSpPr>
+        <p:spPr>
+          <a:xfrm>
+            <a:off x="4029126" y="3840734"/>
+            <a:ext cx="640080" cy="640080"/>
+          </a:xfrm>
+          <a:prstGeom prst="ellipse">
+            <a:avLst/>
+          </a:prstGeom>
+        </p:spPr>
+        <p:style>
+          <a:lnRef idx="1">
+            <a:schemeClr val="accent1"/>
+          </a:lnRef>
+          <a:fillRef idx="3">
+            <a:schemeClr val="accent1"/>
+          </a:fillRef>
+          <a:effectRef idx="2">
+            <a:schemeClr val="accent1"/>
+          </a:effectRef>
+          <a:fontRef idx="minor">
+            <a:schemeClr val="lt1"/>
+          </a:fontRef>
+        </p:style>
+        <p:txBody>
+          <a:bodyPr rtlCol="0" anchor="ctr"/>
+          <a:lstStyle/>
+          <a:p>
+            <a:pPr algn="ctr"/>
+            <a:r>
+              <a:rPr lang="en-US" sz="4000" dirty="0" smtClean="0"/>
+              <a:t>W</a:t>
+            </a:r>
+            <a:endParaRPr lang="en-US" sz="4000" dirty="0"/>
+          </a:p>
+        </p:txBody>
+      </p:sp>
+      <p:sp>
+        <p:nvSpPr>
+          <p:cNvPr id="32" name="Oval 31"/>
+          <p:cNvSpPr>
+            <a:spLocks noChangeAspect="1"/>
+          </p:cNvSpPr>
+          <p:nvPr/>
+        </p:nvSpPr>
+        <p:spPr>
+          <a:xfrm>
+            <a:off x="1170107" y="1549141"/>
+            <a:ext cx="640080" cy="640080"/>
+          </a:xfrm>
+          <a:prstGeom prst="ellipse">
+            <a:avLst/>
+          </a:prstGeom>
+        </p:spPr>
+        <p:style>
+          <a:lnRef idx="1">
+            <a:schemeClr val="accent1"/>
+          </a:lnRef>
+          <a:fillRef idx="3">
+            <a:schemeClr val="accent1"/>
+          </a:fillRef>
+          <a:effectRef idx="2">
+            <a:schemeClr val="accent1"/>
+          </a:effectRef>
+          <a:fontRef idx="minor">
+            <a:schemeClr val="lt1"/>
+          </a:fontRef>
+        </p:style>
+        <p:txBody>
+          <a:bodyPr rtlCol="0" anchor="ctr"/>
+          <a:lstStyle/>
+          <a:p>
+            <a:pPr algn="ctr"/>
+            <a:r>
+              <a:rPr lang="en-US" sz="4000" dirty="0" smtClean="0"/>
+              <a:t>U</a:t>
+            </a:r>
+            <a:endParaRPr lang="en-US" sz="4000" dirty="0"/>
+          </a:p>
+        </p:txBody>
+      </p:sp>
+      <p:sp>
+        <p:nvSpPr>
+          <p:cNvPr id="38" name="Oval 37"/>
+          <p:cNvSpPr>
+            <a:spLocks noChangeAspect="1"/>
+          </p:cNvSpPr>
+          <p:nvPr/>
+        </p:nvSpPr>
+        <p:spPr>
+          <a:xfrm>
+            <a:off x="864665" y="3853573"/>
+            <a:ext cx="640080" cy="640080"/>
+          </a:xfrm>
+          <a:prstGeom prst="ellipse">
+            <a:avLst/>
+          </a:prstGeom>
+        </p:spPr>
+        <p:style>
+          <a:lnRef idx="1">
+            <a:schemeClr val="accent1"/>
+          </a:lnRef>
+          <a:fillRef idx="3">
+            <a:schemeClr val="accent1"/>
+          </a:fillRef>
+          <a:effectRef idx="2">
+            <a:schemeClr val="accent1"/>
+          </a:effectRef>
+          <a:fontRef idx="minor">
+            <a:schemeClr val="lt1"/>
+          </a:fontRef>
+        </p:style>
+        <p:txBody>
+          <a:bodyPr rtlCol="0" anchor="ctr"/>
+          <a:lstStyle/>
+          <a:p>
+            <a:pPr algn="ctr"/>
+            <a:r>
+              <a:rPr lang="en-US" sz="4000" dirty="0" smtClean="0"/>
+              <a:t>V</a:t>
+            </a:r>
+            <a:endParaRPr lang="en-US" sz="4000" dirty="0"/>
+          </a:p>
+        </p:txBody>
+      </p:sp>
+      <p:cxnSp>
+        <p:nvCxnSpPr>
+          <p:cNvPr id="41" name="Straight Arrow Connector 40"/>
+          <p:cNvCxnSpPr/>
+          <p:nvPr/>
+        </p:nvCxnSpPr>
+        <p:spPr>
+          <a:xfrm>
+            <a:off x="474197" y="1869181"/>
+            <a:ext cx="780935" cy="0"/>
+          </a:xfrm>
+          <a:prstGeom prst="straightConnector1">
+            <a:avLst/>
+          </a:prstGeom>
+          <a:ln w="76200" cmpd="sng">
+            <a:tailEnd type="arrow"/>
+          </a:ln>
+        </p:spPr>
+        <p:style>
+          <a:lnRef idx="2">
+            <a:schemeClr val="accent1"/>
+          </a:lnRef>
+          <a:fillRef idx="0">
+            <a:schemeClr val="accent1"/>
+          </a:fillRef>
+          <a:effectRef idx="1">
+            <a:schemeClr val="accent1"/>
+          </a:effectRef>
+          <a:fontRef idx="minor">
+            <a:schemeClr val="tx1"/>
+          </a:fontRef>
+        </p:style>
+      </p:cxnSp>
+      <p:cxnSp>
+        <p:nvCxnSpPr>
+          <p:cNvPr id="45" name="Straight Arrow Connector 44"/>
+          <p:cNvCxnSpPr/>
+          <p:nvPr/>
+        </p:nvCxnSpPr>
+        <p:spPr>
+          <a:xfrm flipV="1">
+            <a:off x="3341929" y="4219226"/>
+            <a:ext cx="687197" cy="1"/>
+          </a:xfrm>
+          <a:prstGeom prst="straightConnector1">
+            <a:avLst/>
+          </a:prstGeom>
+          <a:ln w="76200" cmpd="sng">
+            <a:tailEnd type="arrow"/>
+          </a:ln>
+        </p:spPr>
+        <p:style>
+          <a:lnRef idx="2">
+            <a:schemeClr val="accent1"/>
+          </a:lnRef>
+          <a:fillRef idx="0">
+            <a:schemeClr val="accent1"/>
+          </a:fillRef>
+          <a:effectRef idx="1">
+            <a:schemeClr val="accent1"/>
+          </a:effectRef>
+          <a:fontRef idx="minor">
+            <a:schemeClr val="tx1"/>
+          </a:fontRef>
+        </p:style>
+      </p:cxnSp>
+      <p:sp>
+        <p:nvSpPr>
+          <p:cNvPr id="29" name="TextBox 28"/>
+          <p:cNvSpPr txBox="1"/>
+          <p:nvPr/>
+        </p:nvSpPr>
+        <p:spPr>
+          <a:xfrm>
+            <a:off x="843918" y="3064667"/>
+            <a:ext cx="1300356" cy="523220"/>
+          </a:xfrm>
+          <a:prstGeom prst="rect">
+            <a:avLst/>
+          </a:prstGeom>
+          <a:noFill/>
+        </p:spPr>
+        <p:txBody>
+          <a:bodyPr wrap="none" rtlCol="0">
+            <a:spAutoFit/>
+          </a:bodyPr>
+          <a:lstStyle/>
+          <a:p>
+            <a:r>
+              <a:rPr lang="en-US" sz="2800" dirty="0" smtClean="0"/>
+              <a:t>Event V</a:t>
+            </a:r>
+            <a:endParaRPr lang="en-US" sz="2800" dirty="0"/>
+          </a:p>
+        </p:txBody>
+      </p:sp>
+      <p:cxnSp>
+        <p:nvCxnSpPr>
+          <p:cNvPr id="31" name="Straight Arrow Connector 30"/>
+          <p:cNvCxnSpPr>
+            <a:stCxn id="29" idx="2"/>
+            <a:endCxn id="38" idx="0"/>
+          </p:cNvCxnSpPr>
+          <p:nvPr/>
+        </p:nvCxnSpPr>
+        <p:spPr>
+          <a:xfrm flipH="1">
+            <a:off x="1184705" y="3587887"/>
+            <a:ext cx="309391" cy="265686"/>
+          </a:xfrm>
+          <a:prstGeom prst="straightConnector1">
+            <a:avLst/>
+          </a:prstGeom>
+          <a:ln>
+            <a:prstDash val="dash"/>
+            <a:tailEnd type="arrow"/>
+          </a:ln>
+        </p:spPr>
+        <p:style>
+          <a:lnRef idx="2">
+            <a:schemeClr val="accent1"/>
+          </a:lnRef>
+          <a:fillRef idx="0">
+            <a:schemeClr val="accent1"/>
+          </a:fillRef>
+          <a:effectRef idx="1">
+            <a:schemeClr val="accent1"/>
+          </a:effectRef>
+          <a:fontRef idx="minor">
+            <a:schemeClr val="tx1"/>
+          </a:fontRef>
+        </p:style>
+      </p:cxnSp>
+      <p:cxnSp>
+        <p:nvCxnSpPr>
+          <p:cNvPr id="58" name="Straight Connector 57"/>
+          <p:cNvCxnSpPr/>
+          <p:nvPr/>
+        </p:nvCxnSpPr>
+        <p:spPr>
+          <a:xfrm>
+            <a:off x="2951120" y="1259631"/>
+            <a:ext cx="0" cy="3856477"/>
+          </a:xfrm>
+          <a:prstGeom prst="line">
+            <a:avLst/>
+          </a:prstGeom>
+          <a:ln w="76200" cmpd="sng">
+            <a:solidFill>
+              <a:srgbClr val="660066"/>
+            </a:solidFill>
+          </a:ln>
+        </p:spPr>
+        <p:style>
+          <a:lnRef idx="2">
+            <a:schemeClr val="accent1"/>
+          </a:lnRef>
+          <a:fillRef idx="0">
+            <a:schemeClr val="accent1"/>
+          </a:fillRef>
+          <a:effectRef idx="1">
+            <a:schemeClr val="accent1"/>
+          </a:effectRef>
+          <a:fontRef idx="minor">
+            <a:schemeClr val="tx1"/>
+          </a:fontRef>
+        </p:style>
+      </p:cxnSp>
+      <p:sp>
+        <p:nvSpPr>
+          <p:cNvPr id="59" name="TextBox 58"/>
+          <p:cNvSpPr txBox="1"/>
+          <p:nvPr/>
+        </p:nvSpPr>
+        <p:spPr>
+          <a:xfrm>
+            <a:off x="2988930" y="4493653"/>
+            <a:ext cx="415498" cy="646331"/>
+          </a:xfrm>
+          <a:prstGeom prst="rect">
+            <a:avLst/>
+          </a:prstGeom>
+          <a:solidFill>
+            <a:srgbClr val="FFFF00"/>
+          </a:solidFill>
+        </p:spPr>
+        <p:txBody>
+          <a:bodyPr wrap="none" rtlCol="0">
+            <a:spAutoFit/>
+          </a:bodyPr>
+          <a:lstStyle/>
+          <a:p>
+            <a:r>
+              <a:rPr lang="en-US" sz="3600" b="1" dirty="0"/>
+              <a:t>T</a:t>
+            </a:r>
+          </a:p>
+        </p:txBody>
+      </p:sp>
+      <p:sp>
+        <p:nvSpPr>
+          <p:cNvPr id="60" name="TextBox 59"/>
+          <p:cNvSpPr txBox="1"/>
+          <p:nvPr/>
+        </p:nvSpPr>
+        <p:spPr>
+          <a:xfrm>
+            <a:off x="1670937" y="5095631"/>
+            <a:ext cx="1163700" cy="523220"/>
+          </a:xfrm>
+          <a:prstGeom prst="rect">
+            <a:avLst/>
+          </a:prstGeom>
+          <a:noFill/>
+        </p:spPr>
+        <p:txBody>
+          <a:bodyPr wrap="none" rtlCol="0">
+            <a:spAutoFit/>
+          </a:bodyPr>
+          <a:lstStyle/>
+          <a:p>
+            <a:r>
+              <a:rPr lang="en-US" sz="2800" dirty="0" smtClean="0"/>
+              <a:t>Time T</a:t>
+            </a:r>
+            <a:endParaRPr lang="en-US" sz="2800" dirty="0"/>
+          </a:p>
+        </p:txBody>
+      </p:sp>
+      <p:cxnSp>
+        <p:nvCxnSpPr>
+          <p:cNvPr id="61" name="Straight Arrow Connector 60"/>
+          <p:cNvCxnSpPr>
+            <a:stCxn id="60" idx="3"/>
+          </p:cNvCxnSpPr>
+          <p:nvPr/>
+        </p:nvCxnSpPr>
+        <p:spPr>
+          <a:xfrm flipV="1">
+            <a:off x="2834637" y="5116108"/>
+            <a:ext cx="116483" cy="241133"/>
+          </a:xfrm>
+          <a:prstGeom prst="straightConnector1">
+            <a:avLst/>
+          </a:prstGeom>
+          <a:ln>
+            <a:tailEnd type="arrow"/>
+          </a:ln>
+        </p:spPr>
+        <p:style>
+          <a:lnRef idx="2">
+            <a:schemeClr val="accent1"/>
+          </a:lnRef>
+          <a:fillRef idx="0">
+            <a:schemeClr val="accent1"/>
+          </a:fillRef>
+          <a:effectRef idx="1">
+            <a:schemeClr val="accent1"/>
+          </a:effectRef>
+          <a:fontRef idx="minor">
+            <a:schemeClr val="tx1"/>
+          </a:fontRef>
+        </p:style>
+      </p:cxnSp>
+    </p:spTree>
+    <p:extLst>
+      <p:ext uri="{BB962C8B-B14F-4D97-AF65-F5344CB8AC3E}">
+        <p14:creationId xmlns:p14="http://schemas.microsoft.com/office/powerpoint/2010/main" val="520465508"/>
+      </p:ext>
+    </p:extLst>
+  </p:cSld>
+  <p:clrMapOvr>
+    <a:masterClrMapping/>
+  </p:clrMapOvr>
+</p:sld>
+</file>
+
+<file path=ppt/slides/slide13.xml><?xml version="1.0" encoding="utf-8"?>
+<p:sld xmlns:a="http://schemas.openxmlformats.org/drawingml/2006/main" xmlns:r="http://schemas.openxmlformats.org/officeDocument/2006/relationships" xmlns:p="http://schemas.openxmlformats.org/presentationml/2006/main">
+  <p:cSld>
+    <p:spTree>
+      <p:nvGrpSpPr>
+        <p:cNvPr id="1" name=""/>
+        <p:cNvGrpSpPr/>
+        <p:nvPr/>
+      </p:nvGrpSpPr>
+      <p:grpSpPr>
+        <a:xfrm>
+          <a:off x="0" y="0"/>
+          <a:ext cx="0" cy="0"/>
+          <a:chOff x="0" y="0"/>
+          <a:chExt cx="0" cy="0"/>
+        </a:xfrm>
+      </p:grpSpPr>
+      <p:cxnSp>
+        <p:nvCxnSpPr>
+          <p:cNvPr id="4" name="Straight Arrow Connector 3"/>
+          <p:cNvCxnSpPr/>
+          <p:nvPr/>
+        </p:nvCxnSpPr>
+        <p:spPr>
+          <a:xfrm flipV="1">
+            <a:off x="482910" y="1844407"/>
+            <a:ext cx="7655026" cy="24774"/>
+          </a:xfrm>
+          <a:prstGeom prst="straightConnector1">
+            <a:avLst/>
+          </a:prstGeom>
+          <a:ln w="76200" cmpd="sng">
+            <a:tailEnd type="arrow"/>
+          </a:ln>
+        </p:spPr>
+        <p:style>
+          <a:lnRef idx="2">
+            <a:schemeClr val="accent1"/>
+          </a:lnRef>
+          <a:fillRef idx="0">
+            <a:schemeClr val="accent1"/>
+          </a:fillRef>
+          <a:effectRef idx="1">
+            <a:schemeClr val="accent1"/>
+          </a:effectRef>
+          <a:fontRef idx="minor">
+            <a:schemeClr val="tx1"/>
+          </a:fontRef>
+        </p:style>
+      </p:cxnSp>
+      <p:cxnSp>
+        <p:nvCxnSpPr>
+          <p:cNvPr id="6" name="Straight Arrow Connector 5"/>
+          <p:cNvCxnSpPr/>
+          <p:nvPr/>
+        </p:nvCxnSpPr>
+        <p:spPr>
+          <a:xfrm flipV="1">
+            <a:off x="482910" y="4173613"/>
+            <a:ext cx="7655026" cy="24774"/>
+          </a:xfrm>
+          <a:prstGeom prst="straightConnector1">
+            <a:avLst/>
+          </a:prstGeom>
+          <a:ln w="76200" cmpd="sng">
+            <a:tailEnd type="arrow"/>
+          </a:ln>
+        </p:spPr>
+        <p:style>
+          <a:lnRef idx="2">
+            <a:schemeClr val="accent1"/>
+          </a:lnRef>
+          <a:fillRef idx="0">
+            <a:schemeClr val="accent1"/>
+          </a:fillRef>
+          <a:effectRef idx="1">
+            <a:schemeClr val="accent1"/>
+          </a:effectRef>
+          <a:fontRef idx="minor">
+            <a:schemeClr val="tx1"/>
+          </a:fontRef>
+        </p:style>
+      </p:cxnSp>
+      <p:cxnSp>
+        <p:nvCxnSpPr>
+          <p:cNvPr id="7" name="Straight Arrow Connector 6"/>
+          <p:cNvCxnSpPr>
+            <a:stCxn id="32" idx="5"/>
+            <a:endCxn id="5" idx="1"/>
+          </p:cNvCxnSpPr>
+          <p:nvPr/>
+        </p:nvCxnSpPr>
+        <p:spPr>
+          <a:xfrm>
+            <a:off x="1716449" y="2095483"/>
+            <a:ext cx="2406415" cy="1838989"/>
+          </a:xfrm>
+          <a:prstGeom prst="straightConnector1">
+            <a:avLst/>
+          </a:prstGeom>
+          <a:ln w="76200" cmpd="sng">
+            <a:solidFill>
+              <a:srgbClr val="FF0000"/>
+            </a:solidFill>
+            <a:tailEnd type="arrow"/>
+          </a:ln>
+        </p:spPr>
+        <p:style>
+          <a:lnRef idx="2">
+            <a:schemeClr val="accent1"/>
+          </a:lnRef>
+          <a:fillRef idx="0">
+            <a:schemeClr val="accent1"/>
+          </a:fillRef>
+          <a:effectRef idx="1">
+            <a:schemeClr val="accent1"/>
+          </a:effectRef>
+          <a:fontRef idx="minor">
+            <a:schemeClr val="tx1"/>
+          </a:fontRef>
+        </p:style>
+      </p:cxnSp>
+      <p:sp>
+        <p:nvSpPr>
+          <p:cNvPr id="22" name="TextBox 21"/>
+          <p:cNvSpPr txBox="1"/>
+          <p:nvPr/>
+        </p:nvSpPr>
+        <p:spPr>
+          <a:xfrm>
+            <a:off x="7295275" y="1259631"/>
+            <a:ext cx="433332" cy="584776"/>
+          </a:xfrm>
+          <a:prstGeom prst="rect">
+            <a:avLst/>
+          </a:prstGeom>
+          <a:noFill/>
+        </p:spPr>
+        <p:txBody>
+          <a:bodyPr wrap="none" rtlCol="0">
+            <a:spAutoFit/>
+          </a:bodyPr>
+          <a:lstStyle/>
+          <a:p>
+            <a:r>
+              <a:rPr lang="en-US" sz="3200" b="1" dirty="0" smtClean="0"/>
+              <a:t>A</a:t>
+            </a:r>
+            <a:endParaRPr lang="en-US" sz="3200" b="1" dirty="0"/>
+          </a:p>
+        </p:txBody>
+      </p:sp>
+      <p:sp>
+        <p:nvSpPr>
+          <p:cNvPr id="23" name="TextBox 22"/>
+          <p:cNvSpPr txBox="1"/>
+          <p:nvPr/>
+        </p:nvSpPr>
+        <p:spPr>
+          <a:xfrm>
+            <a:off x="7368856" y="4173613"/>
+            <a:ext cx="414697" cy="584776"/>
+          </a:xfrm>
+          <a:prstGeom prst="rect">
+            <a:avLst/>
+          </a:prstGeom>
+          <a:noFill/>
+        </p:spPr>
+        <p:txBody>
+          <a:bodyPr wrap="none" rtlCol="0">
+            <a:spAutoFit/>
+          </a:bodyPr>
+          <a:lstStyle/>
+          <a:p>
+            <a:r>
+              <a:rPr lang="en-US" sz="3200" b="1" dirty="0"/>
+              <a:t>B</a:t>
+            </a:r>
+          </a:p>
+        </p:txBody>
+      </p:sp>
+      <p:sp>
+        <p:nvSpPr>
+          <p:cNvPr id="34" name="TextBox 33"/>
+          <p:cNvSpPr txBox="1"/>
+          <p:nvPr/>
+        </p:nvSpPr>
+        <p:spPr>
+          <a:xfrm>
+            <a:off x="3101480" y="3338444"/>
+            <a:ext cx="657151" cy="584776"/>
+          </a:xfrm>
+          <a:prstGeom prst="rect">
+            <a:avLst/>
+          </a:prstGeom>
+          <a:noFill/>
+        </p:spPr>
+        <p:txBody>
+          <a:bodyPr wrap="none" rtlCol="0">
+            <a:spAutoFit/>
+          </a:bodyPr>
+          <a:lstStyle/>
+          <a:p>
+            <a:r>
+              <a:rPr lang="en-US" sz="3200" b="1" dirty="0" smtClean="0"/>
+              <a:t>m</a:t>
+            </a:r>
+            <a:r>
+              <a:rPr lang="en-US" sz="3200" b="1" baseline="-25000" dirty="0"/>
+              <a:t>1</a:t>
+            </a:r>
+          </a:p>
+        </p:txBody>
+      </p:sp>
+      <p:sp>
+        <p:nvSpPr>
+          <p:cNvPr id="37" name="TextBox 36"/>
+          <p:cNvSpPr txBox="1"/>
+          <p:nvPr/>
+        </p:nvSpPr>
+        <p:spPr>
+          <a:xfrm>
+            <a:off x="5598185" y="676481"/>
+            <a:ext cx="3214166" cy="523220"/>
+          </a:xfrm>
+          <a:prstGeom prst="rect">
+            <a:avLst/>
+          </a:prstGeom>
+          <a:noFill/>
+        </p:spPr>
+        <p:txBody>
+          <a:bodyPr wrap="none" rtlCol="0">
+            <a:spAutoFit/>
+          </a:bodyPr>
+          <a:lstStyle/>
+          <a:p>
+            <a:r>
+              <a:rPr lang="en-US" sz="2800" b="1" dirty="0" smtClean="0"/>
+              <a:t>Timeline for agent A</a:t>
+            </a:r>
+            <a:endParaRPr lang="en-US" sz="2800" b="1" dirty="0"/>
+          </a:p>
+        </p:txBody>
+      </p:sp>
+      <p:cxnSp>
+        <p:nvCxnSpPr>
+          <p:cNvPr id="39" name="Straight Arrow Connector 38"/>
+          <p:cNvCxnSpPr>
+            <a:stCxn id="37" idx="2"/>
+          </p:cNvCxnSpPr>
+          <p:nvPr/>
+        </p:nvCxnSpPr>
+        <p:spPr>
+          <a:xfrm flipH="1">
+            <a:off x="6992156" y="1199701"/>
+            <a:ext cx="213112" cy="669480"/>
+          </a:xfrm>
+          <a:prstGeom prst="straightConnector1">
+            <a:avLst/>
+          </a:prstGeom>
+          <a:ln>
+            <a:prstDash val="dash"/>
+            <a:tailEnd type="arrow"/>
+          </a:ln>
+        </p:spPr>
+        <p:style>
+          <a:lnRef idx="2">
+            <a:schemeClr val="accent1"/>
+          </a:lnRef>
+          <a:fillRef idx="0">
+            <a:schemeClr val="accent1"/>
+          </a:fillRef>
+          <a:effectRef idx="1">
+            <a:schemeClr val="accent1"/>
+          </a:effectRef>
+          <a:fontRef idx="minor">
+            <a:schemeClr val="tx1"/>
+          </a:fontRef>
+        </p:style>
+      </p:cxnSp>
+      <p:sp>
+        <p:nvSpPr>
+          <p:cNvPr id="40" name="TextBox 39"/>
+          <p:cNvSpPr txBox="1"/>
+          <p:nvPr/>
+        </p:nvSpPr>
+        <p:spPr>
+          <a:xfrm>
+            <a:off x="5170034" y="4885275"/>
+            <a:ext cx="3197861" cy="523220"/>
+          </a:xfrm>
+          <a:prstGeom prst="rect">
+            <a:avLst/>
+          </a:prstGeom>
+          <a:noFill/>
+        </p:spPr>
+        <p:txBody>
+          <a:bodyPr wrap="none" rtlCol="0">
+            <a:spAutoFit/>
+          </a:bodyPr>
+          <a:lstStyle/>
+          <a:p>
+            <a:r>
+              <a:rPr lang="en-US" sz="2800" b="1" dirty="0" smtClean="0"/>
+              <a:t>Timeline for agent B</a:t>
+            </a:r>
+            <a:endParaRPr lang="en-US" sz="2800" b="1" dirty="0"/>
+          </a:p>
+        </p:txBody>
+      </p:sp>
+      <p:cxnSp>
+        <p:nvCxnSpPr>
+          <p:cNvPr id="42" name="Straight Arrow Connector 41"/>
+          <p:cNvCxnSpPr>
+            <a:stCxn id="40" idx="0"/>
+          </p:cNvCxnSpPr>
+          <p:nvPr/>
+        </p:nvCxnSpPr>
+        <p:spPr>
+          <a:xfrm flipV="1">
+            <a:off x="6768965" y="4198387"/>
+            <a:ext cx="223191" cy="686888"/>
+          </a:xfrm>
+          <a:prstGeom prst="straightConnector1">
+            <a:avLst/>
+          </a:prstGeom>
+          <a:ln>
+            <a:prstDash val="dash"/>
+            <a:tailEnd type="arrow"/>
+          </a:ln>
+        </p:spPr>
+        <p:style>
+          <a:lnRef idx="2">
+            <a:schemeClr val="accent1"/>
+          </a:lnRef>
+          <a:fillRef idx="0">
+            <a:schemeClr val="accent1"/>
+          </a:fillRef>
+          <a:effectRef idx="1">
+            <a:schemeClr val="accent1"/>
+          </a:effectRef>
+          <a:fontRef idx="minor">
+            <a:schemeClr val="tx1"/>
+          </a:fontRef>
+        </p:style>
+      </p:cxnSp>
+      <p:sp>
+        <p:nvSpPr>
+          <p:cNvPr id="43" name="TextBox 42"/>
+          <p:cNvSpPr txBox="1"/>
+          <p:nvPr/>
+        </p:nvSpPr>
+        <p:spPr>
+          <a:xfrm>
+            <a:off x="399535" y="5761806"/>
+            <a:ext cx="5738486" cy="523220"/>
+          </a:xfrm>
+          <a:prstGeom prst="rect">
+            <a:avLst/>
+          </a:prstGeom>
+          <a:noFill/>
+        </p:spPr>
+        <p:txBody>
+          <a:bodyPr wrap="none" rtlCol="0">
+            <a:spAutoFit/>
+          </a:bodyPr>
+          <a:lstStyle/>
+          <a:p>
+            <a:r>
+              <a:rPr lang="en-US" sz="2800" b="1" dirty="0" smtClean="0"/>
+              <a:t>Message </a:t>
+            </a:r>
+            <a:r>
+              <a:rPr lang="en-US" sz="2800" b="1" dirty="0" smtClean="0"/>
+              <a:t>m</a:t>
+            </a:r>
+            <a:r>
+              <a:rPr lang="en-US" sz="2800" b="1" baseline="-25000" dirty="0"/>
+              <a:t>1</a:t>
+            </a:r>
+            <a:r>
+              <a:rPr lang="en-US" sz="2800" b="1" baseline="-25000" dirty="0" smtClean="0"/>
+              <a:t> </a:t>
+            </a:r>
+            <a:r>
+              <a:rPr lang="en-US" sz="2800" b="1" dirty="0" smtClean="0"/>
+              <a:t>received </a:t>
+            </a:r>
+            <a:r>
+              <a:rPr lang="en-US" sz="2800" b="1" dirty="0" smtClean="0"/>
+              <a:t>by B in event W</a:t>
+            </a:r>
+            <a:endParaRPr lang="en-US" sz="2800" b="1" dirty="0"/>
+          </a:p>
+        </p:txBody>
+      </p:sp>
+      <p:sp>
+        <p:nvSpPr>
+          <p:cNvPr id="44" name="TextBox 43"/>
+          <p:cNvSpPr txBox="1"/>
+          <p:nvPr/>
+        </p:nvSpPr>
+        <p:spPr>
+          <a:xfrm>
+            <a:off x="178856" y="261610"/>
+            <a:ext cx="5034017" cy="523220"/>
+          </a:xfrm>
+          <a:prstGeom prst="rect">
+            <a:avLst/>
+          </a:prstGeom>
+          <a:noFill/>
+        </p:spPr>
+        <p:txBody>
+          <a:bodyPr wrap="none" rtlCol="0">
+            <a:spAutoFit/>
+          </a:bodyPr>
+          <a:lstStyle/>
+          <a:p>
+            <a:r>
+              <a:rPr lang="en-US" sz="2800" b="1" dirty="0" smtClean="0"/>
+              <a:t>Message </a:t>
+            </a:r>
+            <a:r>
+              <a:rPr lang="en-US" sz="2800" b="1" dirty="0" smtClean="0"/>
+              <a:t>m</a:t>
+            </a:r>
+            <a:r>
+              <a:rPr lang="en-US" sz="2800" b="1" baseline="-25000" dirty="0"/>
+              <a:t>1</a:t>
+            </a:r>
+            <a:r>
+              <a:rPr lang="en-US" sz="2800" b="1" baseline="-25000" dirty="0" smtClean="0"/>
+              <a:t> </a:t>
+            </a:r>
+            <a:r>
+              <a:rPr lang="en-US" sz="2800" b="1" dirty="0" smtClean="0"/>
+              <a:t>sent </a:t>
+            </a:r>
+            <a:r>
+              <a:rPr lang="en-US" sz="2800" b="1" dirty="0" smtClean="0"/>
+              <a:t>by A in event U</a:t>
+            </a:r>
+            <a:endParaRPr lang="en-US" sz="2800" b="1" dirty="0"/>
+          </a:p>
+        </p:txBody>
+      </p:sp>
+      <p:cxnSp>
+        <p:nvCxnSpPr>
+          <p:cNvPr id="48" name="Straight Arrow Connector 47"/>
+          <p:cNvCxnSpPr>
+            <a:stCxn id="44" idx="2"/>
+            <a:endCxn id="32" idx="0"/>
+          </p:cNvCxnSpPr>
+          <p:nvPr/>
+        </p:nvCxnSpPr>
+        <p:spPr>
+          <a:xfrm flipH="1">
+            <a:off x="1490147" y="784830"/>
+            <a:ext cx="1205718" cy="764311"/>
+          </a:xfrm>
+          <a:prstGeom prst="straightConnector1">
+            <a:avLst/>
+          </a:prstGeom>
+          <a:ln>
+            <a:prstDash val="dash"/>
+            <a:tailEnd type="arrow"/>
+          </a:ln>
+        </p:spPr>
+        <p:style>
+          <a:lnRef idx="2">
+            <a:schemeClr val="accent1"/>
+          </a:lnRef>
+          <a:fillRef idx="0">
+            <a:schemeClr val="accent1"/>
+          </a:fillRef>
+          <a:effectRef idx="1">
+            <a:schemeClr val="accent1"/>
+          </a:effectRef>
+          <a:fontRef idx="minor">
+            <a:schemeClr val="tx1"/>
+          </a:fontRef>
+        </p:style>
+      </p:cxnSp>
+      <p:cxnSp>
+        <p:nvCxnSpPr>
+          <p:cNvPr id="50" name="Straight Arrow Connector 49"/>
+          <p:cNvCxnSpPr>
+            <a:stCxn id="43" idx="0"/>
+            <a:endCxn id="5" idx="4"/>
+          </p:cNvCxnSpPr>
+          <p:nvPr/>
+        </p:nvCxnSpPr>
+        <p:spPr>
+          <a:xfrm flipV="1">
+            <a:off x="3268778" y="4480814"/>
+            <a:ext cx="1080388" cy="1280992"/>
+          </a:xfrm>
+          <a:prstGeom prst="straightConnector1">
+            <a:avLst/>
+          </a:prstGeom>
+          <a:ln>
+            <a:prstDash val="dash"/>
+            <a:tailEnd type="arrow"/>
+          </a:ln>
+        </p:spPr>
+        <p:style>
+          <a:lnRef idx="2">
+            <a:schemeClr val="accent1"/>
+          </a:lnRef>
+          <a:fillRef idx="0">
+            <a:schemeClr val="accent1"/>
+          </a:fillRef>
+          <a:effectRef idx="1">
+            <a:schemeClr val="accent1"/>
+          </a:effectRef>
+          <a:fontRef idx="minor">
+            <a:schemeClr val="tx1"/>
+          </a:fontRef>
+        </p:style>
+      </p:cxnSp>
+      <p:sp>
+        <p:nvSpPr>
+          <p:cNvPr id="5" name="Oval 4"/>
+          <p:cNvSpPr>
+            <a:spLocks noChangeAspect="1"/>
+          </p:cNvSpPr>
+          <p:nvPr/>
+        </p:nvSpPr>
+        <p:spPr>
+          <a:xfrm>
+            <a:off x="4029126" y="3840734"/>
+            <a:ext cx="640080" cy="640080"/>
+          </a:xfrm>
+          <a:prstGeom prst="ellipse">
+            <a:avLst/>
+          </a:prstGeom>
+        </p:spPr>
+        <p:style>
+          <a:lnRef idx="1">
+            <a:schemeClr val="accent1"/>
+          </a:lnRef>
+          <a:fillRef idx="3">
+            <a:schemeClr val="accent1"/>
+          </a:fillRef>
+          <a:effectRef idx="2">
+            <a:schemeClr val="accent1"/>
+          </a:effectRef>
+          <a:fontRef idx="minor">
+            <a:schemeClr val="lt1"/>
+          </a:fontRef>
+        </p:style>
+        <p:txBody>
+          <a:bodyPr rtlCol="0" anchor="ctr"/>
+          <a:lstStyle/>
+          <a:p>
+            <a:pPr algn="ctr"/>
+            <a:r>
+              <a:rPr lang="en-US" sz="4000" dirty="0" smtClean="0"/>
+              <a:t>W</a:t>
+            </a:r>
+            <a:endParaRPr lang="en-US" sz="4000" dirty="0"/>
+          </a:p>
+        </p:txBody>
+      </p:sp>
+      <p:sp>
+        <p:nvSpPr>
+          <p:cNvPr id="32" name="Oval 31"/>
+          <p:cNvSpPr>
+            <a:spLocks noChangeAspect="1"/>
+          </p:cNvSpPr>
+          <p:nvPr/>
+        </p:nvSpPr>
+        <p:spPr>
+          <a:xfrm>
+            <a:off x="1170107" y="1549141"/>
+            <a:ext cx="640080" cy="640080"/>
+          </a:xfrm>
+          <a:prstGeom prst="ellipse">
+            <a:avLst/>
+          </a:prstGeom>
+        </p:spPr>
+        <p:style>
+          <a:lnRef idx="1">
+            <a:schemeClr val="accent1"/>
+          </a:lnRef>
+          <a:fillRef idx="3">
+            <a:schemeClr val="accent1"/>
+          </a:fillRef>
+          <a:effectRef idx="2">
+            <a:schemeClr val="accent1"/>
+          </a:effectRef>
+          <a:fontRef idx="minor">
+            <a:schemeClr val="lt1"/>
+          </a:fontRef>
+        </p:style>
+        <p:txBody>
+          <a:bodyPr rtlCol="0" anchor="ctr"/>
+          <a:lstStyle/>
+          <a:p>
+            <a:pPr algn="ctr"/>
+            <a:r>
+              <a:rPr lang="en-US" sz="4000" dirty="0" smtClean="0"/>
+              <a:t>U</a:t>
+            </a:r>
+            <a:endParaRPr lang="en-US" sz="4000" dirty="0"/>
+          </a:p>
+        </p:txBody>
+      </p:sp>
+      <p:sp>
+        <p:nvSpPr>
+          <p:cNvPr id="38" name="Oval 37"/>
+          <p:cNvSpPr>
+            <a:spLocks noChangeAspect="1"/>
+          </p:cNvSpPr>
+          <p:nvPr/>
+        </p:nvSpPr>
+        <p:spPr>
+          <a:xfrm>
+            <a:off x="864665" y="3853573"/>
+            <a:ext cx="640080" cy="640080"/>
+          </a:xfrm>
+          <a:prstGeom prst="ellipse">
+            <a:avLst/>
+          </a:prstGeom>
+        </p:spPr>
+        <p:style>
+          <a:lnRef idx="1">
+            <a:schemeClr val="accent1"/>
+          </a:lnRef>
+          <a:fillRef idx="3">
+            <a:schemeClr val="accent1"/>
+          </a:fillRef>
+          <a:effectRef idx="2">
+            <a:schemeClr val="accent1"/>
+          </a:effectRef>
+          <a:fontRef idx="minor">
+            <a:schemeClr val="lt1"/>
+          </a:fontRef>
+        </p:style>
+        <p:txBody>
+          <a:bodyPr rtlCol="0" anchor="ctr"/>
+          <a:lstStyle/>
+          <a:p>
+            <a:pPr algn="ctr"/>
+            <a:r>
+              <a:rPr lang="en-US" sz="4000" dirty="0" smtClean="0"/>
+              <a:t>V</a:t>
+            </a:r>
+            <a:endParaRPr lang="en-US" sz="4000" dirty="0"/>
+          </a:p>
+        </p:txBody>
+      </p:sp>
+      <p:cxnSp>
+        <p:nvCxnSpPr>
+          <p:cNvPr id="41" name="Straight Arrow Connector 40"/>
+          <p:cNvCxnSpPr/>
+          <p:nvPr/>
+        </p:nvCxnSpPr>
+        <p:spPr>
+          <a:xfrm>
+            <a:off x="474197" y="1869181"/>
+            <a:ext cx="780935" cy="0"/>
+          </a:xfrm>
+          <a:prstGeom prst="straightConnector1">
+            <a:avLst/>
+          </a:prstGeom>
+          <a:ln w="76200" cmpd="sng">
+            <a:tailEnd type="arrow"/>
+          </a:ln>
+        </p:spPr>
+        <p:style>
+          <a:lnRef idx="2">
+            <a:schemeClr val="accent1"/>
+          </a:lnRef>
+          <a:fillRef idx="0">
+            <a:schemeClr val="accent1"/>
+          </a:fillRef>
+          <a:effectRef idx="1">
+            <a:schemeClr val="accent1"/>
+          </a:effectRef>
+          <a:fontRef idx="minor">
+            <a:schemeClr val="tx1"/>
+          </a:fontRef>
+        </p:style>
+      </p:cxnSp>
+      <p:cxnSp>
+        <p:nvCxnSpPr>
+          <p:cNvPr id="45" name="Straight Arrow Connector 44"/>
+          <p:cNvCxnSpPr/>
+          <p:nvPr/>
+        </p:nvCxnSpPr>
+        <p:spPr>
+          <a:xfrm flipV="1">
+            <a:off x="3341929" y="4219226"/>
+            <a:ext cx="687197" cy="1"/>
+          </a:xfrm>
+          <a:prstGeom prst="straightConnector1">
+            <a:avLst/>
+          </a:prstGeom>
+          <a:ln w="76200" cmpd="sng">
+            <a:tailEnd type="arrow"/>
+          </a:ln>
+        </p:spPr>
+        <p:style>
+          <a:lnRef idx="2">
+            <a:schemeClr val="accent1"/>
+          </a:lnRef>
+          <a:fillRef idx="0">
+            <a:schemeClr val="accent1"/>
+          </a:fillRef>
+          <a:effectRef idx="1">
+            <a:schemeClr val="accent1"/>
+          </a:effectRef>
+          <a:fontRef idx="minor">
+            <a:schemeClr val="tx1"/>
+          </a:fontRef>
+        </p:style>
+      </p:cxnSp>
+      <p:sp>
+        <p:nvSpPr>
+          <p:cNvPr id="29" name="TextBox 28"/>
+          <p:cNvSpPr txBox="1"/>
+          <p:nvPr/>
+        </p:nvSpPr>
+        <p:spPr>
+          <a:xfrm>
+            <a:off x="843918" y="3064667"/>
+            <a:ext cx="1300356" cy="523220"/>
+          </a:xfrm>
+          <a:prstGeom prst="rect">
+            <a:avLst/>
+          </a:prstGeom>
+          <a:noFill/>
+        </p:spPr>
+        <p:txBody>
+          <a:bodyPr wrap="none" rtlCol="0">
+            <a:spAutoFit/>
+          </a:bodyPr>
+          <a:lstStyle/>
+          <a:p>
+            <a:r>
+              <a:rPr lang="en-US" sz="2800" dirty="0" smtClean="0"/>
+              <a:t>Event V</a:t>
+            </a:r>
+            <a:endParaRPr lang="en-US" sz="2800" dirty="0"/>
+          </a:p>
+        </p:txBody>
+      </p:sp>
+      <p:cxnSp>
+        <p:nvCxnSpPr>
+          <p:cNvPr id="31" name="Straight Arrow Connector 30"/>
+          <p:cNvCxnSpPr>
+            <a:stCxn id="29" idx="2"/>
+            <a:endCxn id="38" idx="0"/>
+          </p:cNvCxnSpPr>
+          <p:nvPr/>
+        </p:nvCxnSpPr>
+        <p:spPr>
+          <a:xfrm flipH="1">
+            <a:off x="1184705" y="3587887"/>
+            <a:ext cx="309391" cy="265686"/>
+          </a:xfrm>
+          <a:prstGeom prst="straightConnector1">
+            <a:avLst/>
+          </a:prstGeom>
+          <a:ln>
+            <a:prstDash val="dash"/>
+            <a:tailEnd type="arrow"/>
+          </a:ln>
+        </p:spPr>
+        <p:style>
+          <a:lnRef idx="2">
+            <a:schemeClr val="accent1"/>
+          </a:lnRef>
+          <a:fillRef idx="0">
+            <a:schemeClr val="accent1"/>
+          </a:fillRef>
+          <a:effectRef idx="1">
+            <a:schemeClr val="accent1"/>
+          </a:effectRef>
+          <a:fontRef idx="minor">
+            <a:schemeClr val="tx1"/>
+          </a:fontRef>
+        </p:style>
+      </p:cxnSp>
+      <p:sp>
+        <p:nvSpPr>
+          <p:cNvPr id="52" name="TextBox 51"/>
+          <p:cNvSpPr txBox="1"/>
+          <p:nvPr/>
+        </p:nvSpPr>
+        <p:spPr>
+          <a:xfrm>
+            <a:off x="3341929" y="2124682"/>
+            <a:ext cx="5125594" cy="1077218"/>
+          </a:xfrm>
+          <a:prstGeom prst="rect">
+            <a:avLst/>
+          </a:prstGeom>
+          <a:solidFill>
+            <a:srgbClr val="FFFF00"/>
+          </a:solidFill>
+        </p:spPr>
+        <p:txBody>
+          <a:bodyPr wrap="square" rtlCol="0">
+            <a:spAutoFit/>
+          </a:bodyPr>
+          <a:lstStyle/>
+          <a:p>
+            <a:r>
+              <a:rPr lang="en-US" sz="3200" b="1" dirty="0" smtClean="0"/>
+              <a:t>Event W depends on events U, </a:t>
+            </a:r>
+            <a:r>
+              <a:rPr lang="en-US" sz="3200" b="1" dirty="0"/>
+              <a:t>V</a:t>
+            </a:r>
+            <a:r>
+              <a:rPr lang="en-US" sz="3200" b="1" dirty="0" smtClean="0"/>
+              <a:t> and their predecessors</a:t>
+            </a:r>
+            <a:endParaRPr lang="en-US" sz="3200" b="1" dirty="0"/>
+          </a:p>
+        </p:txBody>
+      </p:sp>
+    </p:spTree>
+    <p:extLst>
+      <p:ext uri="{BB962C8B-B14F-4D97-AF65-F5344CB8AC3E}">
+        <p14:creationId xmlns:p14="http://schemas.microsoft.com/office/powerpoint/2010/main" val="665510750"/>
+      </p:ext>
+    </p:extLst>
+  </p:cSld>
+  <p:clrMapOvr>
+    <a:masterClrMapping/>
+  </p:clrMapOvr>
+</p:sld>
+</file>
+
 <file path=ppt/slides/slide2.xml><?xml version="1.0" encoding="utf-8"?>
 <p:sld xmlns:a="http://schemas.openxmlformats.org/drawingml/2006/main" xmlns:r="http://schemas.openxmlformats.org/officeDocument/2006/relationships" xmlns:p="http://schemas.openxmlformats.org/presentationml/2006/main">
   <p:cSld>
@@ -10803,6 +12572,72 @@
           </a:p>
         </p:txBody>
       </p:sp>
+      <p:cxnSp>
+        <p:nvCxnSpPr>
+          <p:cNvPr id="31" name="Straight Arrow Connector 30"/>
+          <p:cNvCxnSpPr/>
+          <p:nvPr/>
+        </p:nvCxnSpPr>
+        <p:spPr>
+          <a:xfrm>
+            <a:off x="6778634" y="1869181"/>
+            <a:ext cx="516641" cy="1006887"/>
+          </a:xfrm>
+          <a:prstGeom prst="straightConnector1">
+            <a:avLst/>
+          </a:prstGeom>
+          <a:ln w="76200" cmpd="sng">
+            <a:solidFill>
+              <a:srgbClr val="FF0000"/>
+            </a:solidFill>
+            <a:tailEnd type="arrow"/>
+          </a:ln>
+        </p:spPr>
+        <p:style>
+          <a:lnRef idx="2">
+            <a:schemeClr val="accent1"/>
+          </a:lnRef>
+          <a:fillRef idx="0">
+            <a:schemeClr val="accent1"/>
+          </a:fillRef>
+          <a:effectRef idx="1">
+            <a:schemeClr val="accent1"/>
+          </a:effectRef>
+          <a:fontRef idx="minor">
+            <a:schemeClr val="tx1"/>
+          </a:fontRef>
+        </p:style>
+      </p:cxnSp>
+      <p:sp>
+        <p:nvSpPr>
+          <p:cNvPr id="34" name="TextBox 33"/>
+          <p:cNvSpPr txBox="1"/>
+          <p:nvPr/>
+        </p:nvSpPr>
+        <p:spPr>
+          <a:xfrm>
+            <a:off x="6994952" y="2825237"/>
+            <a:ext cx="600645" cy="584776"/>
+          </a:xfrm>
+          <a:prstGeom prst="rect">
+            <a:avLst/>
+          </a:prstGeom>
+          <a:noFill/>
+        </p:spPr>
+        <p:txBody>
+          <a:bodyPr wrap="none" rtlCol="0">
+            <a:spAutoFit/>
+          </a:bodyPr>
+          <a:lstStyle/>
+          <a:p>
+            <a:r>
+              <a:rPr lang="en-US" sz="3200" b="1" dirty="0" smtClean="0"/>
+              <a:t>14</a:t>
+            </a:r>
+            <a:endParaRPr lang="en-US" sz="3200" b="1" baseline="-25000" dirty="0"/>
+          </a:p>
+        </p:txBody>
+      </p:sp>
     </p:spTree>
     <p:extLst>
       <p:ext uri="{BB962C8B-B14F-4D97-AF65-F5344CB8AC3E}">
@@ -11778,6 +13613,72 @@
           </a:p>
         </p:txBody>
       </p:sp>
+      <p:cxnSp>
+        <p:nvCxnSpPr>
+          <p:cNvPr id="31" name="Straight Arrow Connector 30"/>
+          <p:cNvCxnSpPr/>
+          <p:nvPr/>
+        </p:nvCxnSpPr>
+        <p:spPr>
+          <a:xfrm>
+            <a:off x="6778634" y="1869181"/>
+            <a:ext cx="516641" cy="1006887"/>
+          </a:xfrm>
+          <a:prstGeom prst="straightConnector1">
+            <a:avLst/>
+          </a:prstGeom>
+          <a:ln w="76200" cmpd="sng">
+            <a:solidFill>
+              <a:srgbClr val="FF0000"/>
+            </a:solidFill>
+            <a:tailEnd type="arrow"/>
+          </a:ln>
+        </p:spPr>
+        <p:style>
+          <a:lnRef idx="2">
+            <a:schemeClr val="accent1"/>
+          </a:lnRef>
+          <a:fillRef idx="0">
+            <a:schemeClr val="accent1"/>
+          </a:fillRef>
+          <a:effectRef idx="1">
+            <a:schemeClr val="accent1"/>
+          </a:effectRef>
+          <a:fontRef idx="minor">
+            <a:schemeClr val="tx1"/>
+          </a:fontRef>
+        </p:style>
+      </p:cxnSp>
+      <p:sp>
+        <p:nvSpPr>
+          <p:cNvPr id="32" name="TextBox 31"/>
+          <p:cNvSpPr txBox="1"/>
+          <p:nvPr/>
+        </p:nvSpPr>
+        <p:spPr>
+          <a:xfrm>
+            <a:off x="6994952" y="2825237"/>
+            <a:ext cx="600645" cy="584776"/>
+          </a:xfrm>
+          <a:prstGeom prst="rect">
+            <a:avLst/>
+          </a:prstGeom>
+          <a:noFill/>
+        </p:spPr>
+        <p:txBody>
+          <a:bodyPr wrap="none" rtlCol="0">
+            <a:spAutoFit/>
+          </a:bodyPr>
+          <a:lstStyle/>
+          <a:p>
+            <a:r>
+              <a:rPr lang="en-US" sz="3200" b="1" dirty="0" smtClean="0"/>
+              <a:t>14</a:t>
+            </a:r>
+            <a:endParaRPr lang="en-US" sz="3200" b="1" baseline="-25000" dirty="0"/>
+          </a:p>
+        </p:txBody>
+      </p:sp>
     </p:spTree>
     <p:extLst>
       <p:ext uri="{BB962C8B-B14F-4D97-AF65-F5344CB8AC3E}">
@@ -12020,7 +13921,7 @@
         </p:nvSpPr>
         <p:spPr>
           <a:xfrm>
-            <a:off x="7368856" y="2296700"/>
+            <a:off x="7930587" y="2296700"/>
             <a:ext cx="414697" cy="584776"/>
           </a:xfrm>
           <a:prstGeom prst="rect">
@@ -12750,6 +14651,72 @@
               <a:t>Each edge: from smaller number to bigger one</a:t>
             </a:r>
             <a:endParaRPr lang="en-US" sz="3600" b="1" dirty="0"/>
+          </a:p>
+        </p:txBody>
+      </p:sp>
+      <p:cxnSp>
+        <p:nvCxnSpPr>
+          <p:cNvPr id="31" name="Straight Arrow Connector 30"/>
+          <p:cNvCxnSpPr/>
+          <p:nvPr/>
+        </p:nvCxnSpPr>
+        <p:spPr>
+          <a:xfrm>
+            <a:off x="7174166" y="1873798"/>
+            <a:ext cx="516641" cy="1006887"/>
+          </a:xfrm>
+          <a:prstGeom prst="straightConnector1">
+            <a:avLst/>
+          </a:prstGeom>
+          <a:ln w="76200" cmpd="sng">
+            <a:solidFill>
+              <a:srgbClr val="FF0000"/>
+            </a:solidFill>
+            <a:tailEnd type="arrow"/>
+          </a:ln>
+        </p:spPr>
+        <p:style>
+          <a:lnRef idx="2">
+            <a:schemeClr val="accent1"/>
+          </a:lnRef>
+          <a:fillRef idx="0">
+            <a:schemeClr val="accent1"/>
+          </a:fillRef>
+          <a:effectRef idx="1">
+            <a:schemeClr val="accent1"/>
+          </a:effectRef>
+          <a:fontRef idx="minor">
+            <a:schemeClr val="tx1"/>
+          </a:fontRef>
+        </p:style>
+      </p:cxnSp>
+      <p:sp>
+        <p:nvSpPr>
+          <p:cNvPr id="32" name="TextBox 31"/>
+          <p:cNvSpPr txBox="1"/>
+          <p:nvPr/>
+        </p:nvSpPr>
+        <p:spPr>
+          <a:xfrm>
+            <a:off x="7243660" y="2825237"/>
+            <a:ext cx="600645" cy="584776"/>
+          </a:xfrm>
+          <a:prstGeom prst="rect">
+            <a:avLst/>
+          </a:prstGeom>
+          <a:noFill/>
+        </p:spPr>
+        <p:txBody>
+          <a:bodyPr wrap="none" rtlCol="0">
+            <a:spAutoFit/>
+          </a:bodyPr>
+          <a:lstStyle/>
+          <a:p>
+            <a:r>
+              <a:rPr lang="en-US" sz="3200" b="1" dirty="0" smtClean="0"/>
+              <a:t>14</a:t>
+            </a:r>
+            <a:endParaRPr lang="en-US" sz="3200" b="1" baseline="-25000" dirty="0"/>
           </a:p>
         </p:txBody>
       </p:sp>
@@ -14063,9 +16030,79 @@
             <a:pPr algn="ctr"/>
             <a:r>
               <a:rPr lang="en-US" sz="2800" dirty="0" smtClean="0"/>
-              <a:t>7,9, 10, 11, 12, 13</a:t>
+              <a:t>7,9, 10, 11, 12, </a:t>
+            </a:r>
+            <a:r>
+              <a:rPr lang="en-US" sz="2800" dirty="0" smtClean="0"/>
+              <a:t>13, 14</a:t>
             </a:r>
             <a:endParaRPr lang="en-US" sz="2800" dirty="0"/>
+          </a:p>
+        </p:txBody>
+      </p:sp>
+      <p:cxnSp>
+        <p:nvCxnSpPr>
+          <p:cNvPr id="42" name="Straight Arrow Connector 41"/>
+          <p:cNvCxnSpPr/>
+          <p:nvPr/>
+        </p:nvCxnSpPr>
+        <p:spPr>
+          <a:xfrm>
+            <a:off x="6752935" y="1929391"/>
+            <a:ext cx="516641" cy="1006887"/>
+          </a:xfrm>
+          <a:prstGeom prst="straightConnector1">
+            <a:avLst/>
+          </a:prstGeom>
+          <a:ln w="76200" cmpd="sng">
+            <a:solidFill>
+              <a:srgbClr val="FF0000"/>
+            </a:solidFill>
+            <a:tailEnd type="arrow"/>
+          </a:ln>
+        </p:spPr>
+        <p:style>
+          <a:lnRef idx="2">
+            <a:schemeClr val="accent1"/>
+          </a:lnRef>
+          <a:fillRef idx="0">
+            <a:schemeClr val="accent1"/>
+          </a:fillRef>
+          <a:effectRef idx="1">
+            <a:schemeClr val="accent1"/>
+          </a:effectRef>
+          <a:fontRef idx="minor">
+            <a:schemeClr val="tx1"/>
+          </a:fontRef>
+        </p:style>
+      </p:cxnSp>
+      <p:sp>
+        <p:nvSpPr>
+          <p:cNvPr id="43" name="TextBox 42"/>
+          <p:cNvSpPr txBox="1"/>
+          <p:nvPr/>
+        </p:nvSpPr>
+        <p:spPr>
+          <a:xfrm>
+            <a:off x="6969253" y="2856702"/>
+            <a:ext cx="600645" cy="584776"/>
+          </a:xfrm>
+          <a:prstGeom prst="rect">
+            <a:avLst/>
+          </a:prstGeom>
+          <a:noFill/>
+        </p:spPr>
+        <p:txBody>
+          <a:bodyPr wrap="none" rtlCol="0">
+            <a:spAutoFit/>
+          </a:bodyPr>
+          <a:lstStyle/>
+          <a:p>
+            <a:r>
+              <a:rPr lang="en-US" sz="3200" b="1" dirty="0" smtClean="0"/>
+              <a:t>14</a:t>
+            </a:r>
+            <a:endParaRPr lang="en-US" sz="3200" b="1" baseline="-25000" dirty="0"/>
           </a:p>
         </p:txBody>
       </p:sp>
@@ -15348,9 +17385,83 @@
             <a:pPr algn="ctr"/>
             <a:r>
               <a:rPr lang="en-US" sz="2800" dirty="0" smtClean="0"/>
-              <a:t>7,9, 10, 12, 13</a:t>
+              <a:t>7,9, 10, 12</a:t>
+            </a:r>
+            <a:r>
+              <a:rPr lang="en-US" sz="2800" smtClean="0"/>
+              <a:t>, </a:t>
+            </a:r>
+            <a:r>
+              <a:rPr lang="en-US" sz="2800" smtClean="0"/>
+              <a:t>13, 14</a:t>
             </a:r>
             <a:endParaRPr lang="en-US" sz="2800" dirty="0"/>
+          </a:p>
+        </p:txBody>
+      </p:sp>
+      <p:cxnSp>
+        <p:nvCxnSpPr>
+          <p:cNvPr id="39" name="Straight Arrow Connector 38"/>
+          <p:cNvCxnSpPr/>
+          <p:nvPr/>
+        </p:nvCxnSpPr>
+        <p:spPr>
+          <a:xfrm>
+            <a:off x="6752935" y="1929391"/>
+            <a:ext cx="516641" cy="1006887"/>
+          </a:xfrm>
+          <a:prstGeom prst="straightConnector1">
+            <a:avLst/>
+          </a:prstGeom>
+          <a:ln w="76200" cmpd="sng">
+            <a:solidFill>
+              <a:srgbClr val="FF0000"/>
+            </a:solidFill>
+            <a:tailEnd type="arrow"/>
+          </a:ln>
+        </p:spPr>
+        <p:style>
+          <a:lnRef idx="2">
+            <a:schemeClr val="accent1"/>
+          </a:lnRef>
+          <a:fillRef idx="0">
+            <a:schemeClr val="accent1"/>
+          </a:fillRef>
+          <a:effectRef idx="1">
+            <a:schemeClr val="accent1"/>
+          </a:effectRef>
+          <a:fontRef idx="minor">
+            <a:schemeClr val="tx1"/>
+          </a:fontRef>
+        </p:style>
+      </p:cxnSp>
+      <p:sp>
+        <p:nvSpPr>
+          <p:cNvPr id="40" name="TextBox 39"/>
+          <p:cNvSpPr txBox="1"/>
+          <p:nvPr/>
+        </p:nvSpPr>
+        <p:spPr>
+          <a:xfrm>
+            <a:off x="6969253" y="2856702"/>
+            <a:ext cx="600645" cy="584776"/>
+          </a:xfrm>
+          <a:prstGeom prst="rect">
+            <a:avLst/>
+          </a:prstGeom>
+          <a:noFill/>
+        </p:spPr>
+        <p:txBody>
+          <a:bodyPr wrap="none" rtlCol="0">
+            <a:spAutoFit/>
+          </a:bodyPr>
+          <a:lstStyle/>
+          <a:p>
+            <a:r>
+              <a:rPr lang="en-US" sz="3200" b="1" dirty="0" smtClean="0"/>
+              <a:t>14</a:t>
+            </a:r>
+            <a:endParaRPr lang="en-US" sz="3200" b="1" baseline="-25000" dirty="0"/>
           </a:p>
         </p:txBody>
       </p:sp>

</xml_diff>